<commit_message>
imagens no ppt 6
</commit_message>
<xml_diff>
--- a/Aula 06/G10 - Apresentacao - Lab05.pptx
+++ b/Aula 06/G10 - Apresentacao - Lab05.pptx
@@ -5,7 +5,7 @@
     <p:sldMasterId id="2147483660" r:id="rId1"/>
   </p:sldMasterIdLst>
   <p:notesMasterIdLst>
-    <p:notesMasterId r:id="rId15"/>
+    <p:notesMasterId r:id="rId16"/>
   </p:notesMasterIdLst>
   <p:sldIdLst>
     <p:sldId id="256" r:id="rId2"/>
@@ -21,6 +21,7 @@
     <p:sldId id="275" r:id="rId12"/>
     <p:sldId id="276" r:id="rId13"/>
     <p:sldId id="277" r:id="rId14"/>
+    <p:sldId id="278" r:id="rId15"/>
   </p:sldIdLst>
   <p:sldSz cx="9144000" cy="6858000" type="screen4x3"/>
   <p:notesSz cx="6858000" cy="9144000"/>
@@ -121,7 +122,7 @@
   </p:defaultTextStyle>
   <p:extLst>
     <p:ext uri="{EFAFB233-063F-42B5-8137-9DF3F51BA10A}">
-      <p15:sldGuideLst xmlns="" xmlns:p15="http://schemas.microsoft.com/office/powerpoint/2012/main">
+      <p15:sldGuideLst xmlns:p15="http://schemas.microsoft.com/office/powerpoint/2012/main" xmlns="">
         <p15:guide id="1" orient="horz" pos="2160">
           <p15:clr>
             <a:srgbClr val="A4A3A4"/>
@@ -9150,12 +9151,61 @@
             </a:r>
             <a:r>
               <a:rPr lang="pt-PT" dirty="0" smtClean="0"/>
-              <a:t>ecrãs					1/4</a:t>
+              <a:t>ecrãs				</a:t>
+            </a:r>
+            <a:r>
+              <a:rPr lang="pt-PT" smtClean="0"/>
+              <a:t>	</a:t>
+            </a:r>
+            <a:r>
+              <a:rPr lang="pt-PT" smtClean="0"/>
+              <a:t>1/5</a:t>
             </a:r>
             <a:endParaRPr lang="pt-PT" dirty="0"/>
           </a:p>
         </p:txBody>
       </p:sp>
+      <p:pic>
+        <p:nvPicPr>
+          <p:cNvPr id="1026" name="Picture 2" descr="C:\Users\Admin\Documents\GitHub\C_C_U-2015-10\Aula 06\Prototipo\ecra inicial.png"/>
+          <p:cNvPicPr>
+            <a:picLocks noChangeAspect="1" noChangeArrowheads="1"/>
+          </p:cNvPicPr>
+          <p:nvPr/>
+        </p:nvPicPr>
+        <p:blipFill>
+          <a:blip r:embed="rId2" cstate="email">
+            <a:extLst>
+              <a:ext uri="{28A0092B-C50C-407E-A947-70E740481C1C}">
+                <a14:useLocalDpi xmlns:a14="http://schemas.microsoft.com/office/drawing/2010/main" val="0"/>
+              </a:ext>
+            </a:extLst>
+          </a:blip>
+          <a:srcRect/>
+          <a:stretch>
+            <a:fillRect/>
+          </a:stretch>
+        </p:blipFill>
+        <p:spPr bwMode="auto">
+          <a:xfrm>
+            <a:off x="1750989" y="1140145"/>
+            <a:ext cx="5493872" cy="5628616"/>
+          </a:xfrm>
+          <a:prstGeom prst="rect">
+            <a:avLst/>
+          </a:prstGeom>
+          <a:noFill/>
+          <a:extLst>
+            <a:ext uri="{909E8E84-426E-40DD-AFC4-6F175D3DCCD1}">
+              <a14:hiddenFill xmlns:a14="http://schemas.microsoft.com/office/drawing/2010/main">
+                <a:solidFill>
+                  <a:srgbClr val="FFFFFF"/>
+                </a:solidFill>
+              </a14:hiddenFill>
+            </a:ext>
+          </a:extLst>
+        </p:spPr>
+      </p:pic>
     </p:spTree>
     <p:extLst>
       <p:ext uri="{BB962C8B-B14F-4D97-AF65-F5344CB8AC3E}">
@@ -9214,12 +9264,57 @@
             </a:r>
             <a:r>
               <a:rPr lang="pt-PT" dirty="0" smtClean="0"/>
-              <a:t>ecrãs					2/4</a:t>
+              <a:t>ecrãs					</a:t>
+            </a:r>
+            <a:r>
+              <a:rPr lang="pt-PT" dirty="0" smtClean="0"/>
+              <a:t>2/5</a:t>
             </a:r>
             <a:endParaRPr lang="pt-PT" dirty="0"/>
           </a:p>
         </p:txBody>
       </p:sp>
+      <p:pic>
+        <p:nvPicPr>
+          <p:cNvPr id="2050" name="Picture 2" descr="C:\Users\Admin\Documents\GitHub\C_C_U-2015-10\Aula 06\Prototipo\Todos os cursos.png"/>
+          <p:cNvPicPr>
+            <a:picLocks noChangeAspect="1" noChangeArrowheads="1"/>
+          </p:cNvPicPr>
+          <p:nvPr/>
+        </p:nvPicPr>
+        <p:blipFill>
+          <a:blip r:embed="rId2" cstate="email">
+            <a:extLst>
+              <a:ext uri="{28A0092B-C50C-407E-A947-70E740481C1C}">
+                <a14:useLocalDpi xmlns:a14="http://schemas.microsoft.com/office/drawing/2010/main" val="0"/>
+              </a:ext>
+            </a:extLst>
+          </a:blip>
+          <a:srcRect/>
+          <a:stretch>
+            <a:fillRect/>
+          </a:stretch>
+        </p:blipFill>
+        <p:spPr bwMode="auto">
+          <a:xfrm>
+            <a:off x="1768509" y="1155560"/>
+            <a:ext cx="5389456" cy="6963904"/>
+          </a:xfrm>
+          <a:prstGeom prst="rect">
+            <a:avLst/>
+          </a:prstGeom>
+          <a:noFill/>
+          <a:extLst>
+            <a:ext uri="{909E8E84-426E-40DD-AFC4-6F175D3DCCD1}">
+              <a14:hiddenFill xmlns:a14="http://schemas.microsoft.com/office/drawing/2010/main">
+                <a:solidFill>
+                  <a:srgbClr val="FFFFFF"/>
+                </a:solidFill>
+              </a14:hiddenFill>
+            </a:ext>
+          </a:extLst>
+        </p:spPr>
+      </p:pic>
     </p:spTree>
     <p:extLst>
       <p:ext uri="{BB962C8B-B14F-4D97-AF65-F5344CB8AC3E}">
@@ -9278,12 +9373,57 @@
             </a:r>
             <a:r>
               <a:rPr lang="pt-PT" dirty="0" smtClean="0"/>
-              <a:t>ecrãs					3/4</a:t>
+              <a:t>ecrãs					</a:t>
+            </a:r>
+            <a:r>
+              <a:rPr lang="pt-PT" dirty="0" smtClean="0"/>
+              <a:t>3/5</a:t>
             </a:r>
             <a:endParaRPr lang="pt-PT" dirty="0"/>
           </a:p>
         </p:txBody>
       </p:sp>
+      <p:pic>
+        <p:nvPicPr>
+          <p:cNvPr id="3074" name="Picture 2" descr="C:\Users\Admin\Documents\GitHub\C_C_U-2015-10\Aula 06\Prototipo\Página Curso de Agricultura - Iniciantes.png"/>
+          <p:cNvPicPr>
+            <a:picLocks noChangeAspect="1" noChangeArrowheads="1"/>
+          </p:cNvPicPr>
+          <p:nvPr/>
+        </p:nvPicPr>
+        <p:blipFill>
+          <a:blip r:embed="rId2" cstate="email">
+            <a:extLst>
+              <a:ext uri="{28A0092B-C50C-407E-A947-70E740481C1C}">
+                <a14:useLocalDpi xmlns:a14="http://schemas.microsoft.com/office/drawing/2010/main" val="0"/>
+              </a:ext>
+            </a:extLst>
+          </a:blip>
+          <a:srcRect/>
+          <a:stretch>
+            <a:fillRect/>
+          </a:stretch>
+        </p:blipFill>
+        <p:spPr bwMode="auto">
+          <a:xfrm>
+            <a:off x="1858946" y="1225671"/>
+            <a:ext cx="5403500" cy="6385955"/>
+          </a:xfrm>
+          <a:prstGeom prst="rect">
+            <a:avLst/>
+          </a:prstGeom>
+          <a:noFill/>
+          <a:extLst>
+            <a:ext uri="{909E8E84-426E-40DD-AFC4-6F175D3DCCD1}">
+              <a14:hiddenFill xmlns:a14="http://schemas.microsoft.com/office/drawing/2010/main">
+                <a:solidFill>
+                  <a:srgbClr val="FFFFFF"/>
+                </a:solidFill>
+              </a14:hiddenFill>
+            </a:ext>
+          </a:extLst>
+        </p:spPr>
+      </p:pic>
     </p:spTree>
     <p:extLst>
       <p:ext uri="{BB962C8B-B14F-4D97-AF65-F5344CB8AC3E}">
@@ -9342,7 +9482,11 @@
             </a:r>
             <a:r>
               <a:rPr lang="pt-PT" dirty="0" smtClean="0"/>
-              <a:t>ecrãs					4/4</a:t>
+              <a:t>ecrãs					</a:t>
+            </a:r>
+            <a:r>
+              <a:rPr lang="pt-PT" dirty="0" smtClean="0"/>
+              <a:t>4/5</a:t>
             </a:r>
             <a:endParaRPr lang="pt-PT" dirty="0"/>
           </a:p>
@@ -9597,7 +9741,7 @@
                   <a:schemeClr val="tx1"/>
                 </a:solidFill>
               </a:rPr>
-              <a:t>Ver ecrãs restantes na nossa página do grupo</a:t>
+              <a:t>Conclusões</a:t>
             </a:r>
             <a:endParaRPr lang="pt-PT" sz="2800" dirty="0">
               <a:solidFill>
@@ -9627,6 +9771,349 @@
     <p:extLst>
       <p:ext uri="{BB962C8B-B14F-4D97-AF65-F5344CB8AC3E}">
         <p14:creationId xmlns:p14="http://schemas.microsoft.com/office/powerpoint/2010/main" val="761073413"/>
+      </p:ext>
+    </p:extLst>
+  </p:cSld>
+  <p:clrMapOvr>
+    <a:masterClrMapping/>
+  </p:clrMapOvr>
+  <p:timing>
+    <p:tnLst>
+      <p:par>
+        <p:cTn id="1" dur="indefinite" restart="never" nodeType="tmRoot"/>
+      </p:par>
+    </p:tnLst>
+  </p:timing>
+</p:sld>
+</file>
+
+<file path=ppt/slides/slide14.xml><?xml version="1.0" encoding="utf-8"?>
+<p:sld xmlns:a="http://schemas.openxmlformats.org/drawingml/2006/main" xmlns:r="http://schemas.openxmlformats.org/officeDocument/2006/relationships" xmlns:p="http://schemas.openxmlformats.org/presentationml/2006/main">
+  <p:cSld>
+    <p:spTree>
+      <p:nvGrpSpPr>
+        <p:cNvPr id="1" name=""/>
+        <p:cNvGrpSpPr/>
+        <p:nvPr/>
+      </p:nvGrpSpPr>
+      <p:grpSpPr>
+        <a:xfrm>
+          <a:off x="0" y="0"/>
+          <a:ext cx="0" cy="0"/>
+          <a:chOff x="0" y="0"/>
+          <a:chExt cx="0" cy="0"/>
+        </a:xfrm>
+      </p:grpSpPr>
+      <p:sp>
+        <p:nvSpPr>
+          <p:cNvPr id="2" name="Title 1"/>
+          <p:cNvSpPr>
+            <a:spLocks noGrp="1"/>
+          </p:cNvSpPr>
+          <p:nvPr>
+            <p:ph type="title"/>
+          </p:nvPr>
+        </p:nvSpPr>
+        <p:spPr/>
+        <p:txBody>
+          <a:bodyPr/>
+          <a:lstStyle/>
+          <a:p>
+            <a:r>
+              <a:rPr lang="pt-PT" dirty="0"/>
+              <a:t>Alguns </a:t>
+            </a:r>
+            <a:r>
+              <a:rPr lang="pt-PT" dirty="0" smtClean="0"/>
+              <a:t>ecrãs					</a:t>
+            </a:r>
+            <a:r>
+              <a:rPr lang="pt-PT" dirty="0" smtClean="0"/>
+              <a:t>5/5</a:t>
+            </a:r>
+            <a:endParaRPr lang="pt-PT" dirty="0"/>
+          </a:p>
+        </p:txBody>
+      </p:sp>
+      <p:sp>
+        <p:nvSpPr>
+          <p:cNvPr id="3" name="Marcador de Posição de Conteúdo 2"/>
+          <p:cNvSpPr txBox="1">
+            <a:spLocks/>
+          </p:cNvSpPr>
+          <p:nvPr/>
+        </p:nvSpPr>
+        <p:spPr>
+          <a:xfrm>
+            <a:off x="498475" y="1981200"/>
+            <a:ext cx="8194260" cy="4324597"/>
+          </a:xfrm>
+          <a:prstGeom prst="rect">
+            <a:avLst/>
+          </a:prstGeom>
+        </p:spPr>
+        <p:txBody>
+          <a:bodyPr vert="horz" lIns="91440" tIns="45720" rIns="91440" bIns="45720" rtlCol="0">
+            <a:noAutofit/>
+          </a:bodyPr>
+          <a:lstStyle>
+            <a:lvl1pPr marL="228600" indent="-228600" algn="l" defTabSz="914400" rtl="0" eaLnBrk="1" latinLnBrk="0" hangingPunct="1">
+              <a:spcBef>
+                <a:spcPts val="2000"/>
+              </a:spcBef>
+              <a:buClr>
+                <a:schemeClr val="accent1"/>
+              </a:buClr>
+              <a:buSzPct val="75000"/>
+              <a:buFont typeface="Wingdings" pitchFamily="2" charset="2"/>
+              <a:buChar char="n"/>
+              <a:defRPr sz="2000" kern="1200">
+                <a:solidFill>
+                  <a:schemeClr val="tx1">
+                    <a:lumMod val="65000"/>
+                    <a:lumOff val="35000"/>
+                  </a:schemeClr>
+                </a:solidFill>
+                <a:latin typeface="+mn-lt"/>
+                <a:ea typeface="+mn-ea"/>
+                <a:cs typeface="+mn-cs"/>
+              </a:defRPr>
+            </a:lvl1pPr>
+            <a:lvl2pPr marL="457200" indent="-228600" algn="l" defTabSz="914400" rtl="0" eaLnBrk="1" latinLnBrk="0" hangingPunct="1">
+              <a:spcBef>
+                <a:spcPts val="600"/>
+              </a:spcBef>
+              <a:buClr>
+                <a:schemeClr val="accent1">
+                  <a:lumMod val="60000"/>
+                  <a:lumOff val="40000"/>
+                </a:schemeClr>
+              </a:buClr>
+              <a:buSzPct val="75000"/>
+              <a:buFont typeface="Wingdings" pitchFamily="2" charset="2"/>
+              <a:buChar char="n"/>
+              <a:defRPr sz="1800" kern="1200">
+                <a:solidFill>
+                  <a:schemeClr val="tx1">
+                    <a:lumMod val="65000"/>
+                    <a:lumOff val="35000"/>
+                  </a:schemeClr>
+                </a:solidFill>
+                <a:latin typeface="+mn-lt"/>
+                <a:ea typeface="+mn-ea"/>
+                <a:cs typeface="+mn-cs"/>
+              </a:defRPr>
+            </a:lvl2pPr>
+            <a:lvl3pPr marL="685800" indent="-228600" algn="l" defTabSz="914400" rtl="0" eaLnBrk="1" latinLnBrk="0" hangingPunct="1">
+              <a:spcBef>
+                <a:spcPts val="600"/>
+              </a:spcBef>
+              <a:buClr>
+                <a:schemeClr val="accent1"/>
+              </a:buClr>
+              <a:buSzPct val="75000"/>
+              <a:buFont typeface="Wingdings" pitchFamily="2" charset="2"/>
+              <a:buChar char="n"/>
+              <a:defRPr sz="1800" kern="1200">
+                <a:solidFill>
+                  <a:schemeClr val="tx1">
+                    <a:lumMod val="65000"/>
+                    <a:lumOff val="35000"/>
+                  </a:schemeClr>
+                </a:solidFill>
+                <a:latin typeface="+mn-lt"/>
+                <a:ea typeface="+mn-ea"/>
+                <a:cs typeface="+mn-cs"/>
+              </a:defRPr>
+            </a:lvl3pPr>
+            <a:lvl4pPr marL="914400" indent="-228600" algn="l" defTabSz="914400" rtl="0" eaLnBrk="1" latinLnBrk="0" hangingPunct="1">
+              <a:spcBef>
+                <a:spcPts val="600"/>
+              </a:spcBef>
+              <a:buClr>
+                <a:schemeClr val="accent1">
+                  <a:lumMod val="60000"/>
+                  <a:lumOff val="40000"/>
+                </a:schemeClr>
+              </a:buClr>
+              <a:buSzPct val="75000"/>
+              <a:buFont typeface="Wingdings" pitchFamily="2" charset="2"/>
+              <a:buChar char="n"/>
+              <a:defRPr sz="1800" kern="1200">
+                <a:solidFill>
+                  <a:schemeClr val="tx1">
+                    <a:lumMod val="65000"/>
+                    <a:lumOff val="35000"/>
+                  </a:schemeClr>
+                </a:solidFill>
+                <a:latin typeface="+mn-lt"/>
+                <a:ea typeface="+mn-ea"/>
+                <a:cs typeface="+mn-cs"/>
+              </a:defRPr>
+            </a:lvl4pPr>
+            <a:lvl5pPr marL="1143000" indent="-228600" algn="l" defTabSz="914400" rtl="0" eaLnBrk="1" latinLnBrk="0" hangingPunct="1">
+              <a:spcBef>
+                <a:spcPts val="600"/>
+              </a:spcBef>
+              <a:buClr>
+                <a:schemeClr val="accent1"/>
+              </a:buClr>
+              <a:buSzPct val="75000"/>
+              <a:buFont typeface="Wingdings" pitchFamily="2" charset="2"/>
+              <a:buChar char="n"/>
+              <a:defRPr sz="1800" kern="1200">
+                <a:solidFill>
+                  <a:schemeClr val="tx1">
+                    <a:lumMod val="65000"/>
+                    <a:lumOff val="35000"/>
+                  </a:schemeClr>
+                </a:solidFill>
+                <a:latin typeface="+mn-lt"/>
+                <a:ea typeface="+mn-ea"/>
+                <a:cs typeface="+mn-cs"/>
+              </a:defRPr>
+            </a:lvl5pPr>
+            <a:lvl6pPr marL="1377950" indent="-228600" algn="l" defTabSz="914400" rtl="0" eaLnBrk="1" latinLnBrk="0" hangingPunct="1">
+              <a:spcBef>
+                <a:spcPct val="20000"/>
+              </a:spcBef>
+              <a:buClr>
+                <a:schemeClr val="accent1">
+                  <a:lumMod val="60000"/>
+                  <a:lumOff val="40000"/>
+                </a:schemeClr>
+              </a:buClr>
+              <a:buSzPct val="75000"/>
+              <a:buFont typeface="Wingdings" pitchFamily="2" charset="2"/>
+              <a:buChar char=""/>
+              <a:defRPr lang="en-US" sz="1800" kern="1200" dirty="0" smtClean="0">
+                <a:solidFill>
+                  <a:schemeClr val="tx1">
+                    <a:lumMod val="65000"/>
+                    <a:lumOff val="35000"/>
+                  </a:schemeClr>
+                </a:solidFill>
+                <a:latin typeface="+mn-lt"/>
+                <a:ea typeface="+mn-ea"/>
+                <a:cs typeface="+mn-cs"/>
+              </a:defRPr>
+            </a:lvl6pPr>
+            <a:lvl7pPr marL="1603375" indent="-228600" algn="l" defTabSz="914400" rtl="0" eaLnBrk="1" latinLnBrk="0" hangingPunct="1">
+              <a:spcBef>
+                <a:spcPct val="20000"/>
+              </a:spcBef>
+              <a:buClr>
+                <a:schemeClr val="accent1"/>
+              </a:buClr>
+              <a:buSzPct val="75000"/>
+              <a:buFont typeface="Wingdings" pitchFamily="2" charset="2"/>
+              <a:buChar char=""/>
+              <a:defRPr lang="en-US" sz="1800" kern="1200" baseline="0" dirty="0" smtClean="0">
+                <a:solidFill>
+                  <a:schemeClr val="tx1">
+                    <a:lumMod val="65000"/>
+                    <a:lumOff val="35000"/>
+                  </a:schemeClr>
+                </a:solidFill>
+                <a:latin typeface="+mn-lt"/>
+                <a:ea typeface="+mn-ea"/>
+                <a:cs typeface="+mn-cs"/>
+              </a:defRPr>
+            </a:lvl7pPr>
+            <a:lvl8pPr marL="1830388" indent="-228600" algn="l" defTabSz="914400" rtl="0" eaLnBrk="1" latinLnBrk="0" hangingPunct="1">
+              <a:spcBef>
+                <a:spcPct val="20000"/>
+              </a:spcBef>
+              <a:buClr>
+                <a:schemeClr val="accent1">
+                  <a:lumMod val="60000"/>
+                  <a:lumOff val="40000"/>
+                </a:schemeClr>
+              </a:buClr>
+              <a:buSzPct val="75000"/>
+              <a:buFont typeface="Wingdings" pitchFamily="2" charset="2"/>
+              <a:buChar char=""/>
+              <a:defRPr lang="en-US" sz="1800" kern="1200" baseline="0" dirty="0" smtClean="0">
+                <a:solidFill>
+                  <a:schemeClr val="tx1">
+                    <a:lumMod val="65000"/>
+                    <a:lumOff val="35000"/>
+                  </a:schemeClr>
+                </a:solidFill>
+                <a:latin typeface="+mn-lt"/>
+                <a:ea typeface="+mn-ea"/>
+                <a:cs typeface="+mn-cs"/>
+              </a:defRPr>
+            </a:lvl8pPr>
+            <a:lvl9pPr marL="2057400" indent="-228600" algn="l" defTabSz="914400" rtl="0" eaLnBrk="1" latinLnBrk="0" hangingPunct="1">
+              <a:spcBef>
+                <a:spcPct val="20000"/>
+              </a:spcBef>
+              <a:buClr>
+                <a:schemeClr val="accent1"/>
+              </a:buClr>
+              <a:buSzPct val="75000"/>
+              <a:buFont typeface="Wingdings" pitchFamily="2" charset="2"/>
+              <a:buChar char=""/>
+              <a:defRPr lang="en-US" sz="1800" kern="1200" baseline="0" dirty="0">
+                <a:solidFill>
+                  <a:schemeClr val="tx1">
+                    <a:lumMod val="65000"/>
+                    <a:lumOff val="35000"/>
+                  </a:schemeClr>
+                </a:solidFill>
+                <a:latin typeface="+mn-lt"/>
+                <a:ea typeface="+mn-ea"/>
+                <a:cs typeface="+mn-cs"/>
+              </a:defRPr>
+            </a:lvl9pPr>
+          </a:lstStyle>
+          <a:p>
+            <a:pPr marL="0" indent="0">
+              <a:lnSpc>
+                <a:spcPct val="150000"/>
+              </a:lnSpc>
+              <a:spcBef>
+                <a:spcPts val="800"/>
+              </a:spcBef>
+              <a:buNone/>
+            </a:pPr>
+            <a:r>
+              <a:rPr lang="pt-PT" sz="2800" dirty="0" smtClean="0">
+                <a:solidFill>
+                  <a:schemeClr val="tx1"/>
+                </a:solidFill>
+              </a:rPr>
+              <a:t>Ver ecrãs restantes na nossa página do grupo</a:t>
+            </a:r>
+            <a:endParaRPr lang="pt-PT" sz="2800" dirty="0">
+              <a:solidFill>
+                <a:schemeClr val="tx1"/>
+              </a:solidFill>
+            </a:endParaRPr>
+          </a:p>
+          <a:p>
+            <a:pPr marL="0" indent="0">
+              <a:lnSpc>
+                <a:spcPct val="150000"/>
+              </a:lnSpc>
+              <a:spcBef>
+                <a:spcPts val="800"/>
+              </a:spcBef>
+              <a:buNone/>
+            </a:pPr>
+            <a:endParaRPr lang="pt-PT" sz="1400" dirty="0">
+              <a:solidFill>
+                <a:schemeClr val="tx1"/>
+              </a:solidFill>
+            </a:endParaRPr>
+          </a:p>
+        </p:txBody>
+      </p:sp>
+    </p:spTree>
+    <p:extLst>
+      <p:ext uri="{BB962C8B-B14F-4D97-AF65-F5344CB8AC3E}">
+        <p14:creationId xmlns:p14="http://schemas.microsoft.com/office/powerpoint/2010/main" val="3195288994"/>
       </p:ext>
     </p:extLst>
   </p:cSld>
@@ -9712,11 +10199,7 @@
           <a:p>
             <a:r>
               <a:rPr lang="pt-PT" sz="6000" dirty="0" smtClean="0"/>
-              <a:t>Modelo </a:t>
-            </a:r>
-            <a:r>
-              <a:rPr lang="pt-PT" sz="6000" dirty="0" smtClean="0"/>
-              <a:t>Conceptual</a:t>
+              <a:t>Modelo Conceptual</a:t>
             </a:r>
             <a:endParaRPr lang="pt-PT" sz="6000" dirty="0"/>
           </a:p>
@@ -10218,11 +10701,7 @@
           <a:p>
             <a:r>
               <a:rPr lang="pt-PT" sz="6000" dirty="0" smtClean="0"/>
-              <a:t>Modelo </a:t>
-            </a:r>
-            <a:r>
-              <a:rPr lang="pt-PT" sz="6000" dirty="0" smtClean="0"/>
-              <a:t>Conceptual</a:t>
+              <a:t>Modelo Conceptual</a:t>
             </a:r>
             <a:endParaRPr lang="pt-PT" sz="6000" dirty="0"/>
           </a:p>
@@ -10331,7 +10810,6 @@
               <a:rPr lang="pt-PT" dirty="0"/>
               <a:t>Interface e interacções</a:t>
             </a:r>
-            <a:endParaRPr lang="pt-PT" dirty="0"/>
           </a:p>
         </p:txBody>
       </p:sp>
@@ -10814,11 +11292,7 @@
           <a:p>
             <a:r>
               <a:rPr lang="pt-PT" sz="6000" dirty="0" smtClean="0"/>
-              <a:t>Modelo </a:t>
-            </a:r>
-            <a:r>
-              <a:rPr lang="pt-PT" sz="6000" dirty="0" smtClean="0"/>
-              <a:t>Conceptual</a:t>
+              <a:t>Modelo Conceptual</a:t>
             </a:r>
             <a:endParaRPr lang="pt-PT" sz="6000" dirty="0"/>
           </a:p>
@@ -12232,13 +12706,8 @@
           <a:p>
             <a:r>
               <a:rPr lang="pt-PT" sz="6000" dirty="0" smtClean="0"/>
-              <a:t>Protótipo de baixa</a:t>
-            </a:r>
-            <a:r>
-              <a:rPr lang="pt-PT" sz="6000" dirty="0" smtClean="0"/>
-              <a:t> fidelidade</a:t>
-            </a:r>
-            <a:endParaRPr lang="pt-PT" sz="6000" dirty="0" smtClean="0"/>
+              <a:t>Protótipo de baixa fidelidade</a:t>
+            </a:r>
           </a:p>
         </p:txBody>
       </p:sp>
@@ -12830,7 +13299,7 @@
   <a:extraClrSchemeLst/>
   <a:extLst>
     <a:ext uri="{05A4C25C-085E-4340-85A3-A5531E510DB2}">
-      <thm15:themeFamily xmlns="" xmlns:thm15="http://schemas.microsoft.com/office/thememl/2012/main" name="Office Theme" id="{62F939B6-93AF-4DB8-9C6B-D6C7DFDC589F}" vid="{4A3C46E8-61CC-4603-A589-7422A47A8E4A}"/>
+      <thm15:themeFamily xmlns:thm15="http://schemas.microsoft.com/office/thememl/2012/main" xmlns="" name="Office Theme" id="{62F939B6-93AF-4DB8-9C6B-D6C7DFDC589F}" vid="{4A3C46E8-61CC-4603-A589-7422A47A8E4A}"/>
     </a:ext>
   </a:extLst>
 </a:theme>

</xml_diff>